<commit_message>
Profit Division Function Updated using Online Learning
</commit_message>
<xml_diff>
--- a/Online Learning for Linear Regression (Forecast).pptx
+++ b/Online Learning for Linear Regression (Forecast).pptx
@@ -7,6 +7,7 @@
   <p:sldIdLst>
     <p:sldId id="256" r:id="rId2"/>
     <p:sldId id="257" r:id="rId3"/>
+    <p:sldId id="260" r:id="rId4"/>
   </p:sldIdLst>
   <p:sldSz cx="12192000" cy="6858000"/>
   <p:notesSz cx="6858000" cy="9144000"/>
@@ -105,6 +106,11 @@
       </a:defRPr>
     </a:lvl9pPr>
   </p:defaultTextStyle>
+  <p:extLst>
+    <p:ext uri="{EFAFB233-063F-42B5-8137-9DF3F51BA10A}">
+      <p15:sldGuideLst xmlns:p15="http://schemas.microsoft.com/office/powerpoint/2012/main"/>
+    </p:ext>
+  </p:extLst>
 </p:presentation>
 </file>
 
@@ -257,7 +263,7 @@
           <a:p>
             <a:fld id="{F5A133F1-822C-4B97-B38F-F038B09D9406}" type="datetimeFigureOut">
               <a:rPr lang="en-IN" smtClean="0"/>
-              <a:t>04-11-2021</a:t>
+              <a:t>02-12-2021</a:t>
             </a:fld>
             <a:endParaRPr lang="en-IN"/>
           </a:p>
@@ -457,7 +463,7 @@
           <a:p>
             <a:fld id="{F5A133F1-822C-4B97-B38F-F038B09D9406}" type="datetimeFigureOut">
               <a:rPr lang="en-IN" smtClean="0"/>
-              <a:t>04-11-2021</a:t>
+              <a:t>02-12-2021</a:t>
             </a:fld>
             <a:endParaRPr lang="en-IN"/>
           </a:p>
@@ -667,7 +673,7 @@
           <a:p>
             <a:fld id="{F5A133F1-822C-4B97-B38F-F038B09D9406}" type="datetimeFigureOut">
               <a:rPr lang="en-IN" smtClean="0"/>
-              <a:t>04-11-2021</a:t>
+              <a:t>02-12-2021</a:t>
             </a:fld>
             <a:endParaRPr lang="en-IN"/>
           </a:p>
@@ -867,7 +873,7 @@
           <a:p>
             <a:fld id="{F5A133F1-822C-4B97-B38F-F038B09D9406}" type="datetimeFigureOut">
               <a:rPr lang="en-IN" smtClean="0"/>
-              <a:t>04-11-2021</a:t>
+              <a:t>02-12-2021</a:t>
             </a:fld>
             <a:endParaRPr lang="en-IN"/>
           </a:p>
@@ -1143,7 +1149,7 @@
           <a:p>
             <a:fld id="{F5A133F1-822C-4B97-B38F-F038B09D9406}" type="datetimeFigureOut">
               <a:rPr lang="en-IN" smtClean="0"/>
-              <a:t>04-11-2021</a:t>
+              <a:t>02-12-2021</a:t>
             </a:fld>
             <a:endParaRPr lang="en-IN"/>
           </a:p>
@@ -1411,7 +1417,7 @@
           <a:p>
             <a:fld id="{F5A133F1-822C-4B97-B38F-F038B09D9406}" type="datetimeFigureOut">
               <a:rPr lang="en-IN" smtClean="0"/>
-              <a:t>04-11-2021</a:t>
+              <a:t>02-12-2021</a:t>
             </a:fld>
             <a:endParaRPr lang="en-IN"/>
           </a:p>
@@ -1826,7 +1832,7 @@
           <a:p>
             <a:fld id="{F5A133F1-822C-4B97-B38F-F038B09D9406}" type="datetimeFigureOut">
               <a:rPr lang="en-IN" smtClean="0"/>
-              <a:t>04-11-2021</a:t>
+              <a:t>02-12-2021</a:t>
             </a:fld>
             <a:endParaRPr lang="en-IN"/>
           </a:p>
@@ -1968,7 +1974,7 @@
           <a:p>
             <a:fld id="{F5A133F1-822C-4B97-B38F-F038B09D9406}" type="datetimeFigureOut">
               <a:rPr lang="en-IN" smtClean="0"/>
-              <a:t>04-11-2021</a:t>
+              <a:t>02-12-2021</a:t>
             </a:fld>
             <a:endParaRPr lang="en-IN"/>
           </a:p>
@@ -2081,7 +2087,7 @@
           <a:p>
             <a:fld id="{F5A133F1-822C-4B97-B38F-F038B09D9406}" type="datetimeFigureOut">
               <a:rPr lang="en-IN" smtClean="0"/>
-              <a:t>04-11-2021</a:t>
+              <a:t>02-12-2021</a:t>
             </a:fld>
             <a:endParaRPr lang="en-IN"/>
           </a:p>
@@ -2394,7 +2400,7 @@
           <a:p>
             <a:fld id="{F5A133F1-822C-4B97-B38F-F038B09D9406}" type="datetimeFigureOut">
               <a:rPr lang="en-IN" smtClean="0"/>
-              <a:t>04-11-2021</a:t>
+              <a:t>02-12-2021</a:t>
             </a:fld>
             <a:endParaRPr lang="en-IN"/>
           </a:p>
@@ -2683,7 +2689,7 @@
           <a:p>
             <a:fld id="{F5A133F1-822C-4B97-B38F-F038B09D9406}" type="datetimeFigureOut">
               <a:rPr lang="en-IN" smtClean="0"/>
-              <a:t>04-11-2021</a:t>
+              <a:t>02-12-2021</a:t>
             </a:fld>
             <a:endParaRPr lang="en-IN"/>
           </a:p>
@@ -2926,7 +2932,7 @@
           <a:p>
             <a:fld id="{F5A133F1-822C-4B97-B38F-F038B09D9406}" type="datetimeFigureOut">
               <a:rPr lang="en-IN" smtClean="0"/>
-              <a:t>04-11-2021</a:t>
+              <a:t>02-12-2021</a:t>
             </a:fld>
             <a:endParaRPr lang="en-IN"/>
           </a:p>
@@ -3366,7 +3372,9 @@
           </a:xfrm>
         </p:spPr>
         <p:txBody>
-          <a:bodyPr/>
+          <a:bodyPr>
+            <a:normAutofit/>
+          </a:bodyPr>
           <a:lstStyle/>
           <a:p>
             <a:r>
@@ -3383,8 +3391,37 @@
                   </a:outerShdw>
                 </a:effectLst>
               </a:rPr>
-              <a:t>Online Learning for Linear Regression (Forecast)</a:t>
-            </a:r>
+              <a:t>Data Market Implementation using </a:t>
+            </a:r>
+            <a:r>
+              <a:rPr lang="en-IN">
+                <a:ln w="0"/>
+                <a:solidFill>
+                  <a:schemeClr val="accent1"/>
+                </a:solidFill>
+                <a:effectLst>
+                  <a:outerShdw blurRad="38100" dist="25400" dir="5400000" algn="ctr" rotWithShape="0">
+                    <a:srgbClr val="6E747A">
+                      <a:alpha val="43000"/>
+                    </a:srgbClr>
+                  </a:outerShdw>
+                </a:effectLst>
+              </a:rPr>
+              <a:t>Online Learning</a:t>
+            </a:r>
+            <a:endParaRPr lang="en-IN" dirty="0">
+              <a:ln w="0"/>
+              <a:solidFill>
+                <a:schemeClr val="accent1"/>
+              </a:solidFill>
+              <a:effectLst>
+                <a:outerShdw blurRad="38100" dist="25400" dir="5400000" algn="ctr" rotWithShape="0">
+                  <a:srgbClr val="6E747A">
+                    <a:alpha val="43000"/>
+                  </a:srgbClr>
+                </a:outerShdw>
+              </a:effectLst>
+            </a:endParaRPr>
           </a:p>
         </p:txBody>
       </p:sp>
@@ -3650,6 +3687,188 @@
     <p:extLst>
       <p:ext uri="{BB962C8B-B14F-4D97-AF65-F5344CB8AC3E}">
         <p14:creationId xmlns:p14="http://schemas.microsoft.com/office/powerpoint/2010/main" val="1794965591"/>
+      </p:ext>
+    </p:extLst>
+  </p:cSld>
+  <p:clrMapOvr>
+    <a:masterClrMapping/>
+  </p:clrMapOvr>
+</p:sld>
+</file>
+
+<file path=ppt/slides/slide3.xml><?xml version="1.0" encoding="utf-8"?>
+<p:sld xmlns:a="http://schemas.openxmlformats.org/drawingml/2006/main" xmlns:r="http://schemas.openxmlformats.org/officeDocument/2006/relationships" xmlns:p="http://schemas.openxmlformats.org/presentationml/2006/main">
+  <p:cSld>
+    <p:spTree>
+      <p:nvGrpSpPr>
+        <p:cNvPr id="1" name=""/>
+        <p:cNvGrpSpPr/>
+        <p:nvPr/>
+      </p:nvGrpSpPr>
+      <p:grpSpPr>
+        <a:xfrm>
+          <a:off x="0" y="0"/>
+          <a:ext cx="0" cy="0"/>
+          <a:chOff x="0" y="0"/>
+          <a:chExt cx="0" cy="0"/>
+        </a:xfrm>
+      </p:grpSpPr>
+      <p:sp>
+        <p:nvSpPr>
+          <p:cNvPr id="2" name="Title 1">
+            <a:extLst>
+              <a:ext uri="{FF2B5EF4-FFF2-40B4-BE49-F238E27FC236}">
+                <a16:creationId xmlns:a16="http://schemas.microsoft.com/office/drawing/2014/main" id="{7EB8A92B-6AFB-4EE6-AA0A-8F5B5F4CEB83}"/>
+              </a:ext>
+            </a:extLst>
+          </p:cNvPr>
+          <p:cNvSpPr>
+            <a:spLocks noGrp="1"/>
+          </p:cNvSpPr>
+          <p:nvPr>
+            <p:ph type="title"/>
+          </p:nvPr>
+        </p:nvSpPr>
+        <p:spPr>
+          <a:xfrm>
+            <a:off x="775447" y="472702"/>
+            <a:ext cx="5186082" cy="2091204"/>
+          </a:xfrm>
+          <a:solidFill>
+            <a:schemeClr val="accent2">
+              <a:lumMod val="50000"/>
+            </a:schemeClr>
+          </a:solidFill>
+        </p:spPr>
+        <p:txBody>
+          <a:bodyPr>
+            <a:noAutofit/>
+          </a:bodyPr>
+          <a:lstStyle/>
+          <a:p>
+            <a:pPr algn="ctr"/>
+            <a:r>
+              <a:rPr lang="en-IN" sz="3600" dirty="0">
+                <a:solidFill>
+                  <a:schemeClr val="bg1"/>
+                </a:solidFill>
+              </a:rPr>
+              <a:t>Comparison of Payment Division using Online Learning</a:t>
+            </a:r>
+          </a:p>
+        </p:txBody>
+      </p:sp>
+      <p:pic>
+        <p:nvPicPr>
+          <p:cNvPr id="8" name="Content Placeholder 7">
+            <a:extLst>
+              <a:ext uri="{FF2B5EF4-FFF2-40B4-BE49-F238E27FC236}">
+                <a16:creationId xmlns:a16="http://schemas.microsoft.com/office/drawing/2014/main" id="{2DE0C637-3D5E-4930-B58A-24E349A4993F}"/>
+              </a:ext>
+            </a:extLst>
+          </p:cNvPr>
+          <p:cNvPicPr>
+            <a:picLocks noGrp="1" noChangeAspect="1"/>
+          </p:cNvPicPr>
+          <p:nvPr>
+            <p:ph idx="1"/>
+          </p:nvPr>
+        </p:nvPicPr>
+        <p:blipFill>
+          <a:blip r:embed="rId2">
+            <a:extLst>
+              <a:ext uri="{28A0092B-C50C-407E-A947-70E740481C1C}">
+                <a14:useLocalDpi xmlns:a14="http://schemas.microsoft.com/office/drawing/2010/main" val="0"/>
+              </a:ext>
+            </a:extLst>
+          </a:blip>
+          <a:stretch>
+            <a:fillRect/>
+          </a:stretch>
+        </p:blipFill>
+        <p:spPr>
+          <a:xfrm>
+            <a:off x="6569130" y="143119"/>
+            <a:ext cx="4975410" cy="3316940"/>
+          </a:xfrm>
+        </p:spPr>
+      </p:pic>
+      <p:pic>
+        <p:nvPicPr>
+          <p:cNvPr id="11" name="Picture 10">
+            <a:extLst>
+              <a:ext uri="{FF2B5EF4-FFF2-40B4-BE49-F238E27FC236}">
+                <a16:creationId xmlns:a16="http://schemas.microsoft.com/office/drawing/2014/main" id="{7A99B3D5-FC98-4E8A-A5CA-9F8FA0394E70}"/>
+              </a:ext>
+            </a:extLst>
+          </p:cNvPr>
+          <p:cNvPicPr>
+            <a:picLocks noChangeAspect="1"/>
+          </p:cNvPicPr>
+          <p:nvPr/>
+        </p:nvPicPr>
+        <p:blipFill>
+          <a:blip r:embed="rId3">
+            <a:extLst>
+              <a:ext uri="{28A0092B-C50C-407E-A947-70E740481C1C}">
+                <a14:useLocalDpi xmlns:a14="http://schemas.microsoft.com/office/drawing/2010/main" val="0"/>
+              </a:ext>
+            </a:extLst>
+          </a:blip>
+          <a:stretch>
+            <a:fillRect/>
+          </a:stretch>
+        </p:blipFill>
+        <p:spPr>
+          <a:xfrm>
+            <a:off x="647460" y="3014810"/>
+            <a:ext cx="5387788" cy="3591859"/>
+          </a:xfrm>
+          <a:prstGeom prst="rect">
+            <a:avLst/>
+          </a:prstGeom>
+        </p:spPr>
+      </p:pic>
+      <p:pic>
+        <p:nvPicPr>
+          <p:cNvPr id="13" name="Picture 12">
+            <a:extLst>
+              <a:ext uri="{FF2B5EF4-FFF2-40B4-BE49-F238E27FC236}">
+                <a16:creationId xmlns:a16="http://schemas.microsoft.com/office/drawing/2014/main" id="{268597B6-A8E8-4943-ADB9-6F931DF77772}"/>
+              </a:ext>
+            </a:extLst>
+          </p:cNvPr>
+          <p:cNvPicPr>
+            <a:picLocks noChangeAspect="1"/>
+          </p:cNvPicPr>
+          <p:nvPr/>
+        </p:nvPicPr>
+        <p:blipFill>
+          <a:blip r:embed="rId4">
+            <a:extLst>
+              <a:ext uri="{28A0092B-C50C-407E-A947-70E740481C1C}">
+                <a14:useLocalDpi xmlns:a14="http://schemas.microsoft.com/office/drawing/2010/main" val="0"/>
+              </a:ext>
+            </a:extLst>
+          </a:blip>
+          <a:stretch>
+            <a:fillRect/>
+          </a:stretch>
+        </p:blipFill>
+        <p:spPr>
+          <a:xfrm>
+            <a:off x="6569130" y="3460059"/>
+            <a:ext cx="4975410" cy="3316940"/>
+          </a:xfrm>
+          <a:prstGeom prst="rect">
+            <a:avLst/>
+          </a:prstGeom>
+        </p:spPr>
+      </p:pic>
+    </p:spTree>
+    <p:extLst>
+      <p:ext uri="{BB962C8B-B14F-4D97-AF65-F5344CB8AC3E}">
+        <p14:creationId xmlns:p14="http://schemas.microsoft.com/office/powerpoint/2010/main" val="3011209738"/>
       </p:ext>
     </p:extLst>
   </p:cSld>

</xml_diff>